<commit_message>
fixed pauseaction fixed config interpreter fixed slideshowviewer's combobox selection
</commit_message>
<xml_diff>
--- a/src/test/resources/org/sikuli/slides/api/fivesteps.pptx
+++ b/src/test/resources/org/sikuli/slides/api/fivesteps.pptx
@@ -3699,6 +3699,38 @@
             <a:r>
               <a:rPr lang="en-US" sz="4000" dirty="0" smtClean="0"/>
               <a:t>Here</a:t>
+            </a:r>
+            <a:endParaRPr lang="en-US" sz="4000" dirty="0"/>
+          </a:p>
+        </p:txBody>
+      </p:sp>
+      <p:sp>
+        <p:nvSpPr>
+          <p:cNvPr id="9" name="TextBox 8"/>
+          <p:cNvSpPr txBox="1"/>
+          <p:nvPr/>
+        </p:nvSpPr>
+        <p:spPr>
+          <a:xfrm>
+            <a:off x="6985597" y="368715"/>
+            <a:ext cx="1420732" cy="707886"/>
+          </a:xfrm>
+          <a:prstGeom prst="rect">
+            <a:avLst/>
+          </a:prstGeom>
+          <a:solidFill>
+            <a:srgbClr val="FFFF00"/>
+          </a:solidFill>
+        </p:spPr>
+        <p:txBody>
+          <a:bodyPr wrap="none" rtlCol="0">
+            <a:spAutoFit/>
+          </a:bodyPr>
+          <a:lstStyle/>
+          <a:p>
+            <a:r>
+              <a:rPr lang="en-US" sz="4000" dirty="0" smtClean="0"/>
+              <a:t>Pause</a:t>
             </a:r>
             <a:endParaRPr lang="en-US" sz="4000" dirty="0"/>
           </a:p>

</xml_diff>

<commit_message>
all unit tests are passed
</commit_message>
<xml_diff>
--- a/src/test/resources/org/sikuli/slides/api/fivesteps.pptx
+++ b/src/test/resources/org/sikuli/slides/api/fivesteps.pptx
@@ -196,7 +196,7 @@
           <a:p>
             <a:fld id="{575EAE28-DD6E-D342-9D11-FD0FD41ECEFF}" type="datetimeFigureOut">
               <a:rPr lang="en-US" smtClean="0"/>
-              <a:t>10/27/13</a:t>
+              <a:t>8/19/14</a:t>
             </a:fld>
             <a:endParaRPr lang="en-US"/>
           </a:p>
@@ -729,7 +729,7 @@
           <a:p>
             <a:fld id="{A0FB1AA8-4F81-414A-9DAE-F97FE8EB8E18}" type="datetimeFigureOut">
               <a:rPr lang="en-US" smtClean="0"/>
-              <a:t>10/27/13</a:t>
+              <a:t>8/19/14</a:t>
             </a:fld>
             <a:endParaRPr lang="en-US"/>
           </a:p>
@@ -899,7 +899,7 @@
           <a:p>
             <a:fld id="{A0FB1AA8-4F81-414A-9DAE-F97FE8EB8E18}" type="datetimeFigureOut">
               <a:rPr lang="en-US" smtClean="0"/>
-              <a:t>10/27/13</a:t>
+              <a:t>8/19/14</a:t>
             </a:fld>
             <a:endParaRPr lang="en-US"/>
           </a:p>
@@ -1079,7 +1079,7 @@
           <a:p>
             <a:fld id="{A0FB1AA8-4F81-414A-9DAE-F97FE8EB8E18}" type="datetimeFigureOut">
               <a:rPr lang="en-US" smtClean="0"/>
-              <a:t>10/27/13</a:t>
+              <a:t>8/19/14</a:t>
             </a:fld>
             <a:endParaRPr lang="en-US"/>
           </a:p>
@@ -1249,7 +1249,7 @@
           <a:p>
             <a:fld id="{A0FB1AA8-4F81-414A-9DAE-F97FE8EB8E18}" type="datetimeFigureOut">
               <a:rPr lang="en-US" smtClean="0"/>
-              <a:t>10/27/13</a:t>
+              <a:t>8/19/14</a:t>
             </a:fld>
             <a:endParaRPr lang="en-US"/>
           </a:p>
@@ -1495,7 +1495,7 @@
           <a:p>
             <a:fld id="{A0FB1AA8-4F81-414A-9DAE-F97FE8EB8E18}" type="datetimeFigureOut">
               <a:rPr lang="en-US" smtClean="0"/>
-              <a:t>10/27/13</a:t>
+              <a:t>8/19/14</a:t>
             </a:fld>
             <a:endParaRPr lang="en-US"/>
           </a:p>
@@ -1783,7 +1783,7 @@
           <a:p>
             <a:fld id="{A0FB1AA8-4F81-414A-9DAE-F97FE8EB8E18}" type="datetimeFigureOut">
               <a:rPr lang="en-US" smtClean="0"/>
-              <a:t>10/27/13</a:t>
+              <a:t>8/19/14</a:t>
             </a:fld>
             <a:endParaRPr lang="en-US"/>
           </a:p>
@@ -2205,7 +2205,7 @@
           <a:p>
             <a:fld id="{A0FB1AA8-4F81-414A-9DAE-F97FE8EB8E18}" type="datetimeFigureOut">
               <a:rPr lang="en-US" smtClean="0"/>
-              <a:t>10/27/13</a:t>
+              <a:t>8/19/14</a:t>
             </a:fld>
             <a:endParaRPr lang="en-US"/>
           </a:p>
@@ -2323,7 +2323,7 @@
           <a:p>
             <a:fld id="{A0FB1AA8-4F81-414A-9DAE-F97FE8EB8E18}" type="datetimeFigureOut">
               <a:rPr lang="en-US" smtClean="0"/>
-              <a:t>10/27/13</a:t>
+              <a:t>8/19/14</a:t>
             </a:fld>
             <a:endParaRPr lang="en-US"/>
           </a:p>
@@ -2418,7 +2418,7 @@
           <a:p>
             <a:fld id="{A0FB1AA8-4F81-414A-9DAE-F97FE8EB8E18}" type="datetimeFigureOut">
               <a:rPr lang="en-US" smtClean="0"/>
-              <a:t>10/27/13</a:t>
+              <a:t>8/19/14</a:t>
             </a:fld>
             <a:endParaRPr lang="en-US"/>
           </a:p>
@@ -2695,7 +2695,7 @@
           <a:p>
             <a:fld id="{A0FB1AA8-4F81-414A-9DAE-F97FE8EB8E18}" type="datetimeFigureOut">
               <a:rPr lang="en-US" smtClean="0"/>
-              <a:t>10/27/13</a:t>
+              <a:t>8/19/14</a:t>
             </a:fld>
             <a:endParaRPr lang="en-US"/>
           </a:p>
@@ -2948,7 +2948,7 @@
           <a:p>
             <a:fld id="{A0FB1AA8-4F81-414A-9DAE-F97FE8EB8E18}" type="datetimeFigureOut">
               <a:rPr lang="en-US" smtClean="0"/>
-              <a:t>10/27/13</a:t>
+              <a:t>8/19/14</a:t>
             </a:fld>
             <a:endParaRPr lang="en-US"/>
           </a:p>
@@ -3161,7 +3161,7 @@
           <a:p>
             <a:fld id="{A0FB1AA8-4F81-414A-9DAE-F97FE8EB8E18}" type="datetimeFigureOut">
               <a:rPr lang="en-US" smtClean="0"/>
-              <a:t>10/27/13</a:t>
+              <a:t>8/19/14</a:t>
             </a:fld>
             <a:endParaRPr lang="en-US"/>
           </a:p>
@@ -3699,38 +3699,6 @@
             <a:r>
               <a:rPr lang="en-US" sz="4000" dirty="0" smtClean="0"/>
               <a:t>Here</a:t>
-            </a:r>
-            <a:endParaRPr lang="en-US" sz="4000" dirty="0"/>
-          </a:p>
-        </p:txBody>
-      </p:sp>
-      <p:sp>
-        <p:nvSpPr>
-          <p:cNvPr id="9" name="TextBox 8"/>
-          <p:cNvSpPr txBox="1"/>
-          <p:nvPr/>
-        </p:nvSpPr>
-        <p:spPr>
-          <a:xfrm>
-            <a:off x="6985597" y="368715"/>
-            <a:ext cx="1420732" cy="707886"/>
-          </a:xfrm>
-          <a:prstGeom prst="rect">
-            <a:avLst/>
-          </a:prstGeom>
-          <a:solidFill>
-            <a:srgbClr val="FFFF00"/>
-          </a:solidFill>
-        </p:spPr>
-        <p:txBody>
-          <a:bodyPr wrap="none" rtlCol="0">
-            <a:spAutoFit/>
-          </a:bodyPr>
-          <a:lstStyle/>
-          <a:p>
-            <a:r>
-              <a:rPr lang="en-US" sz="4000" dirty="0" smtClean="0"/>
-              <a:t>Pause</a:t>
             </a:r>
             <a:endParaRPr lang="en-US" sz="4000" dirty="0"/>
           </a:p>

</xml_diff>